<commit_message>
Power Point Presentation YouRS - Hackathon
YouRS PPT-Hackathon
</commit_message>
<xml_diff>
--- a/YouRS PPT-Peregrine Falcons/YouRS(YouTube v3 Ranking System) (1).pptx
+++ b/YouRS PPT-Peregrine Falcons/YouRS(YouTube v3 Ranking System) (1).pptx
@@ -11423,7 +11423,9 @@
         </p:nvSpPr>
         <p:spPr/>
         <p:txBody>
-          <a:bodyPr/>
+          <a:bodyPr>
+            <a:normAutofit/>
+          </a:bodyPr>
           <a:lstStyle/>
           <a:p>
             <a:pPr marL="0" indent="0">
@@ -11448,29 +11450,27 @@
             </a:pPr>
             <a:r>
               <a:rPr lang="en-US" dirty="0">
+                <a:solidFill>
+                  <a:srgbClr val="FF0000"/>
+                </a:solidFill>
                 <a:hlinkClick r:id="rId3"/>
               </a:rPr>
-              <a:t>http</a:t>
-            </a:r>
-            <a:r>
-              <a:rPr lang="en-US">
+              <a:t>http://</a:t>
+            </a:r>
+            <a:r>
+              <a:rPr lang="en-US" dirty="0" smtClean="0">
+                <a:solidFill>
+                  <a:srgbClr val="FF0000"/>
+                </a:solidFill>
                 <a:hlinkClick r:id="rId3"/>
               </a:rPr>
-              <a:t>://</a:t>
-            </a:r>
-            <a:r>
-              <a:rPr lang="en-US" smtClean="0">
-                <a:hlinkClick r:id="rId3"/>
-              </a:rPr>
-              <a:t>yt-dashboard.azurewebsites.net</a:t>
-            </a:r>
-            <a:r>
-              <a:rPr lang="en-US" dirty="0" smtClean="0">
-                <a:hlinkClick r:id="rId3"/>
-              </a:rPr>
-              <a:t>/</a:t>
-            </a:r>
-            <a:endParaRPr lang="en-US" dirty="0" smtClean="0"/>
+              <a:t>yt-dashboard.azurewebsites.net/</a:t>
+            </a:r>
+            <a:endParaRPr lang="en-US" dirty="0" smtClean="0">
+              <a:solidFill>
+                <a:srgbClr val="FF0000"/>
+              </a:solidFill>
+            </a:endParaRPr>
           </a:p>
           <a:p>
             <a:pPr marL="0" indent="0">
@@ -11481,7 +11481,11 @@
           <a:p>
             <a:r>
               <a:rPr lang="en-US" dirty="0" smtClean="0"/>
-              <a:t>GitHub URL</a:t>
+              <a:t>GitHub </a:t>
+            </a:r>
+            <a:r>
+              <a:rPr lang="en-US" dirty="0" smtClean="0"/>
+              <a:t>URL</a:t>
             </a:r>
           </a:p>
           <a:p>
@@ -11489,24 +11493,45 @@
               <a:buNone/>
             </a:pPr>
             <a:r>
-              <a:rPr lang="en-US" altLang="en-US" dirty="0">
+              <a:rPr lang="en-US" altLang="en-US" dirty="0" smtClean="0">
                 <a:solidFill>
                   <a:srgbClr val="1155CC"/>
                 </a:solidFill>
                 <a:cs typeface="Arial" panose="020B0604020202020204" pitchFamily="34" charset="0"/>
                 <a:hlinkClick r:id="rId4"/>
               </a:rPr>
-              <a:t>https://github.com/vaishnavi5054/YouRS-Hackathon-ASE-</a:t>
-            </a:r>
-            <a:r>
-              <a:rPr lang="en-US" altLang="en-US" dirty="0">
+              <a:t>https://github.com/vaishnavi5054/YouRS-Hackathon-ASE-/tree/master/YouRS%20PPT-Peregrine%20Falcons</a:t>
+            </a:r>
+            <a:endParaRPr lang="en-US" dirty="0"/>
+          </a:p>
+          <a:p>
+            <a:pPr marL="0" indent="0">
+              <a:buNone/>
+            </a:pPr>
+            <a:endParaRPr lang="en-US" dirty="0"/>
+          </a:p>
+          <a:p>
+            <a:pPr marL="0" indent="0">
+              <a:buNone/>
+            </a:pPr>
+            <a:r>
+              <a:rPr lang="en-US" altLang="en-US" dirty="0" smtClean="0">
                 <a:solidFill>
                   <a:schemeClr val="tx1"/>
                 </a:solidFill>
               </a:rPr>
               <a:t> </a:t>
             </a:r>
-            <a:endParaRPr lang="en-US" dirty="0" smtClean="0"/>
+          </a:p>
+          <a:p>
+            <a:pPr marL="0" indent="0">
+              <a:buNone/>
+            </a:pPr>
+            <a:endParaRPr lang="en-US" dirty="0">
+              <a:solidFill>
+                <a:schemeClr val="tx1"/>
+              </a:solidFill>
+            </a:endParaRPr>
           </a:p>
           <a:p>
             <a:pPr marL="0" indent="0">

</xml_diff>